<commit_message>
more work on skip connection and upsampling
</commit_message>
<xml_diff>
--- a/figs/efficientnet_visualization.pptx
+++ b/figs/efficientnet_visualization.pptx
@@ -3984,7 +3984,7 @@
         <p:spPr>
           <a:xfrm>
             <a:off x="380994" y="4428349"/>
-            <a:ext cx="1685925" cy="276999"/>
+            <a:ext cx="1685925" cy="461665"/>
           </a:xfrm>
           <a:prstGeom prst="rect">
             <a:avLst/>
@@ -4005,6 +4005,20 @@
               </a:rPr>
               <a:t>block5c_project_bn</a:t>
             </a:r>
+          </a:p>
+          <a:p>
+            <a:pPr algn="ctr"/>
+            <a:r>
+              <a:rPr lang="en-US" sz="1200" b="1">
+                <a:latin typeface="Arial" panose="020B0604020202020204" pitchFamily="34" charset="0"/>
+                <a:cs typeface="Arial" panose="020B0604020202020204" pitchFamily="34" charset="0"/>
+              </a:rPr>
+              <a:t>block5c_drop</a:t>
+            </a:r>
+            <a:endParaRPr lang="en-US" sz="1200" b="1" dirty="0">
+              <a:latin typeface="Arial" panose="020B0604020202020204" pitchFamily="34" charset="0"/>
+              <a:cs typeface="Arial" panose="020B0604020202020204" pitchFamily="34" charset="0"/>
+            </a:endParaRPr>
           </a:p>
         </p:txBody>
       </p:sp>
@@ -4438,6 +4452,202 @@
               <a:rPr lang="en-US" dirty="0"/>
               <a:t>Bottle Neck</a:t>
             </a:r>
+          </a:p>
+        </p:txBody>
+      </p:sp>
+      <p:sp>
+        <p:nvSpPr>
+          <p:cNvPr id="5" name="Arrow: Right 4">
+            <a:extLst>
+              <a:ext uri="{FF2B5EF4-FFF2-40B4-BE49-F238E27FC236}">
+                <a16:creationId xmlns:a16="http://schemas.microsoft.com/office/drawing/2014/main" id="{E473DDFC-F0ED-410E-A131-41D83460B789}"/>
+              </a:ext>
+            </a:extLst>
+          </p:cNvPr>
+          <p:cNvSpPr/>
+          <p:nvPr/>
+        </p:nvSpPr>
+        <p:spPr>
+          <a:xfrm>
+            <a:off x="3752841" y="4547937"/>
+            <a:ext cx="3790959" cy="185563"/>
+          </a:xfrm>
+          <a:prstGeom prst="rightArrow">
+            <a:avLst/>
+          </a:prstGeom>
+          <a:solidFill>
+            <a:srgbClr val="FF0000"/>
+          </a:solidFill>
+        </p:spPr>
+        <p:style>
+          <a:lnRef idx="2">
+            <a:schemeClr val="accent1">
+              <a:shade val="50000"/>
+            </a:schemeClr>
+          </a:lnRef>
+          <a:fillRef idx="1">
+            <a:schemeClr val="accent1"/>
+          </a:fillRef>
+          <a:effectRef idx="0">
+            <a:schemeClr val="accent1"/>
+          </a:effectRef>
+          <a:fontRef idx="minor">
+            <a:schemeClr val="lt1"/>
+          </a:fontRef>
+        </p:style>
+        <p:txBody>
+          <a:bodyPr rtlCol="0" anchor="ctr"/>
+          <a:lstStyle/>
+          <a:p>
+            <a:pPr algn="ctr"/>
+            <a:endParaRPr lang="en-US"/>
+          </a:p>
+        </p:txBody>
+      </p:sp>
+      <p:sp>
+        <p:nvSpPr>
+          <p:cNvPr id="7" name="Arrow: Right 6">
+            <a:extLst>
+              <a:ext uri="{FF2B5EF4-FFF2-40B4-BE49-F238E27FC236}">
+                <a16:creationId xmlns:a16="http://schemas.microsoft.com/office/drawing/2014/main" id="{42BA0447-9F28-447F-AAA4-A083B50395EC}"/>
+              </a:ext>
+            </a:extLst>
+          </p:cNvPr>
+          <p:cNvSpPr/>
+          <p:nvPr/>
+        </p:nvSpPr>
+        <p:spPr>
+          <a:xfrm>
+            <a:off x="3752841" y="3447556"/>
+            <a:ext cx="3790959" cy="185563"/>
+          </a:xfrm>
+          <a:prstGeom prst="rightArrow">
+            <a:avLst/>
+          </a:prstGeom>
+          <a:solidFill>
+            <a:srgbClr val="FF0000"/>
+          </a:solidFill>
+        </p:spPr>
+        <p:style>
+          <a:lnRef idx="2">
+            <a:schemeClr val="accent1">
+              <a:shade val="50000"/>
+            </a:schemeClr>
+          </a:lnRef>
+          <a:fillRef idx="1">
+            <a:schemeClr val="accent1"/>
+          </a:fillRef>
+          <a:effectRef idx="0">
+            <a:schemeClr val="accent1"/>
+          </a:effectRef>
+          <a:fontRef idx="minor">
+            <a:schemeClr val="lt1"/>
+          </a:fontRef>
+        </p:style>
+        <p:txBody>
+          <a:bodyPr rtlCol="0" anchor="ctr"/>
+          <a:lstStyle/>
+          <a:p>
+            <a:pPr algn="ctr"/>
+            <a:endParaRPr lang="en-US" dirty="0"/>
+          </a:p>
+        </p:txBody>
+      </p:sp>
+      <p:sp>
+        <p:nvSpPr>
+          <p:cNvPr id="9" name="Arrow: Right 8">
+            <a:extLst>
+              <a:ext uri="{FF2B5EF4-FFF2-40B4-BE49-F238E27FC236}">
+                <a16:creationId xmlns:a16="http://schemas.microsoft.com/office/drawing/2014/main" id="{1EDBBCF7-E109-4920-8DE8-854383858C02}"/>
+              </a:ext>
+            </a:extLst>
+          </p:cNvPr>
+          <p:cNvSpPr/>
+          <p:nvPr/>
+        </p:nvSpPr>
+        <p:spPr>
+          <a:xfrm>
+            <a:off x="3706225" y="1791474"/>
+            <a:ext cx="3790959" cy="185563"/>
+          </a:xfrm>
+          <a:prstGeom prst="rightArrow">
+            <a:avLst/>
+          </a:prstGeom>
+          <a:solidFill>
+            <a:srgbClr val="FF0000"/>
+          </a:solidFill>
+        </p:spPr>
+        <p:style>
+          <a:lnRef idx="2">
+            <a:schemeClr val="accent1">
+              <a:shade val="50000"/>
+            </a:schemeClr>
+          </a:lnRef>
+          <a:fillRef idx="1">
+            <a:schemeClr val="accent1"/>
+          </a:fillRef>
+          <a:effectRef idx="0">
+            <a:schemeClr val="accent1"/>
+          </a:effectRef>
+          <a:fontRef idx="minor">
+            <a:schemeClr val="lt1"/>
+          </a:fontRef>
+        </p:style>
+        <p:txBody>
+          <a:bodyPr rtlCol="0" anchor="ctr"/>
+          <a:lstStyle/>
+          <a:p>
+            <a:pPr algn="ctr"/>
+            <a:endParaRPr lang="en-US"/>
+          </a:p>
+        </p:txBody>
+      </p:sp>
+      <p:sp>
+        <p:nvSpPr>
+          <p:cNvPr id="11" name="Arrow: Right 10">
+            <a:extLst>
+              <a:ext uri="{FF2B5EF4-FFF2-40B4-BE49-F238E27FC236}">
+                <a16:creationId xmlns:a16="http://schemas.microsoft.com/office/drawing/2014/main" id="{CC7A960A-09B5-4E4B-9FF7-726D80D946E2}"/>
+              </a:ext>
+            </a:extLst>
+          </p:cNvPr>
+          <p:cNvSpPr/>
+          <p:nvPr/>
+        </p:nvSpPr>
+        <p:spPr>
+          <a:xfrm>
+            <a:off x="3706224" y="901061"/>
+            <a:ext cx="3790959" cy="185563"/>
+          </a:xfrm>
+          <a:prstGeom prst="rightArrow">
+            <a:avLst/>
+          </a:prstGeom>
+          <a:solidFill>
+            <a:srgbClr val="FF0000"/>
+          </a:solidFill>
+        </p:spPr>
+        <p:style>
+          <a:lnRef idx="2">
+            <a:schemeClr val="accent1">
+              <a:shade val="50000"/>
+            </a:schemeClr>
+          </a:lnRef>
+          <a:fillRef idx="1">
+            <a:schemeClr val="accent1"/>
+          </a:fillRef>
+          <a:effectRef idx="0">
+            <a:schemeClr val="accent1"/>
+          </a:effectRef>
+          <a:fontRef idx="minor">
+            <a:schemeClr val="lt1"/>
+          </a:fontRef>
+        </p:style>
+        <p:txBody>
+          <a:bodyPr rtlCol="0" anchor="ctr"/>
+          <a:lstStyle/>
+          <a:p>
+            <a:pPr algn="ctr"/>
+            <a:endParaRPr lang="en-US"/>
           </a:p>
         </p:txBody>
       </p:sp>

</xml_diff>

<commit_message>
eunet built? Need to test on segmentation datasets
</commit_message>
<xml_diff>
--- a/figs/efficientnet_visualization.pptx
+++ b/figs/efficientnet_visualization.pptx
@@ -260,7 +260,7 @@
           <a:p>
             <a:fld id="{010D2E75-7F19-4F26-9D56-9A0E4EE12E35}" type="datetimeFigureOut">
               <a:rPr lang="en-US" smtClean="0"/>
-              <a:t>8/8/2020</a:t>
+              <a:t>8/9/2020</a:t>
             </a:fld>
             <a:endParaRPr lang="en-US"/>
           </a:p>
@@ -458,7 +458,7 @@
           <a:p>
             <a:fld id="{010D2E75-7F19-4F26-9D56-9A0E4EE12E35}" type="datetimeFigureOut">
               <a:rPr lang="en-US" smtClean="0"/>
-              <a:t>8/8/2020</a:t>
+              <a:t>8/9/2020</a:t>
             </a:fld>
             <a:endParaRPr lang="en-US"/>
           </a:p>
@@ -666,7 +666,7 @@
           <a:p>
             <a:fld id="{010D2E75-7F19-4F26-9D56-9A0E4EE12E35}" type="datetimeFigureOut">
               <a:rPr lang="en-US" smtClean="0"/>
-              <a:t>8/8/2020</a:t>
+              <a:t>8/9/2020</a:t>
             </a:fld>
             <a:endParaRPr lang="en-US"/>
           </a:p>
@@ -864,7 +864,7 @@
           <a:p>
             <a:fld id="{010D2E75-7F19-4F26-9D56-9A0E4EE12E35}" type="datetimeFigureOut">
               <a:rPr lang="en-US" smtClean="0"/>
-              <a:t>8/8/2020</a:t>
+              <a:t>8/9/2020</a:t>
             </a:fld>
             <a:endParaRPr lang="en-US"/>
           </a:p>
@@ -1139,7 +1139,7 @@
           <a:p>
             <a:fld id="{010D2E75-7F19-4F26-9D56-9A0E4EE12E35}" type="datetimeFigureOut">
               <a:rPr lang="en-US" smtClean="0"/>
-              <a:t>8/8/2020</a:t>
+              <a:t>8/9/2020</a:t>
             </a:fld>
             <a:endParaRPr lang="en-US"/>
           </a:p>
@@ -1404,7 +1404,7 @@
           <a:p>
             <a:fld id="{010D2E75-7F19-4F26-9D56-9A0E4EE12E35}" type="datetimeFigureOut">
               <a:rPr lang="en-US" smtClean="0"/>
-              <a:t>8/8/2020</a:t>
+              <a:t>8/9/2020</a:t>
             </a:fld>
             <a:endParaRPr lang="en-US"/>
           </a:p>
@@ -1816,7 +1816,7 @@
           <a:p>
             <a:fld id="{010D2E75-7F19-4F26-9D56-9A0E4EE12E35}" type="datetimeFigureOut">
               <a:rPr lang="en-US" smtClean="0"/>
-              <a:t>8/8/2020</a:t>
+              <a:t>8/9/2020</a:t>
             </a:fld>
             <a:endParaRPr lang="en-US"/>
           </a:p>
@@ -1957,7 +1957,7 @@
           <a:p>
             <a:fld id="{010D2E75-7F19-4F26-9D56-9A0E4EE12E35}" type="datetimeFigureOut">
               <a:rPr lang="en-US" smtClean="0"/>
-              <a:t>8/8/2020</a:t>
+              <a:t>8/9/2020</a:t>
             </a:fld>
             <a:endParaRPr lang="en-US"/>
           </a:p>
@@ -2070,7 +2070,7 @@
           <a:p>
             <a:fld id="{010D2E75-7F19-4F26-9D56-9A0E4EE12E35}" type="datetimeFigureOut">
               <a:rPr lang="en-US" smtClean="0"/>
-              <a:t>8/8/2020</a:t>
+              <a:t>8/9/2020</a:t>
             </a:fld>
             <a:endParaRPr lang="en-US"/>
           </a:p>
@@ -2381,7 +2381,7 @@
           <a:p>
             <a:fld id="{010D2E75-7F19-4F26-9D56-9A0E4EE12E35}" type="datetimeFigureOut">
               <a:rPr lang="en-US" smtClean="0"/>
-              <a:t>8/8/2020</a:t>
+              <a:t>8/9/2020</a:t>
             </a:fld>
             <a:endParaRPr lang="en-US"/>
           </a:p>
@@ -2669,7 +2669,7 @@
           <a:p>
             <a:fld id="{010D2E75-7F19-4F26-9D56-9A0E4EE12E35}" type="datetimeFigureOut">
               <a:rPr lang="en-US" smtClean="0"/>
-              <a:t>8/8/2020</a:t>
+              <a:t>8/9/2020</a:t>
             </a:fld>
             <a:endParaRPr lang="en-US"/>
           </a:p>
@@ -2910,7 +2910,7 @@
           <a:p>
             <a:fld id="{010D2E75-7F19-4F26-9D56-9A0E4EE12E35}" type="datetimeFigureOut">
               <a:rPr lang="en-US" smtClean="0"/>
-              <a:t>8/8/2020</a:t>
+              <a:t>8/9/2020</a:t>
             </a:fld>
             <a:endParaRPr lang="en-US"/>
           </a:p>
@@ -3867,7 +3867,7 @@
         <p:spPr>
           <a:xfrm>
             <a:off x="380994" y="3364125"/>
-            <a:ext cx="1685925" cy="276999"/>
+            <a:ext cx="1685925" cy="461665"/>
           </a:xfrm>
           <a:prstGeom prst="rect">
             <a:avLst/>
@@ -3889,6 +3889,16 @@
               <a:t>block4c_project_bn</a:t>
             </a:r>
           </a:p>
+          <a:p>
+            <a:pPr algn="ctr"/>
+            <a:r>
+              <a:rPr lang="en-US" sz="1200" b="1" dirty="0">
+                <a:latin typeface="Arial" panose="020B0604020202020204" pitchFamily="34" charset="0"/>
+                <a:cs typeface="Arial" panose="020B0604020202020204" pitchFamily="34" charset="0"/>
+              </a:rPr>
+              <a:t>block4c_drop</a:t>
+            </a:r>
+          </a:p>
         </p:txBody>
       </p:sp>
       <p:sp>
@@ -4009,16 +4019,12 @@
           <a:p>
             <a:pPr algn="ctr"/>
             <a:r>
-              <a:rPr lang="en-US" sz="1200" b="1">
+              <a:rPr lang="en-US" sz="1200" b="1" dirty="0">
                 <a:latin typeface="Arial" panose="020B0604020202020204" pitchFamily="34" charset="0"/>
                 <a:cs typeface="Arial" panose="020B0604020202020204" pitchFamily="34" charset="0"/>
               </a:rPr>
               <a:t>block5c_drop</a:t>
             </a:r>
-            <a:endParaRPr lang="en-US" sz="1200" b="1" dirty="0">
-              <a:latin typeface="Arial" panose="020B0604020202020204" pitchFamily="34" charset="0"/>
-              <a:cs typeface="Arial" panose="020B0604020202020204" pitchFamily="34" charset="0"/>
-            </a:endParaRPr>
           </a:p>
         </p:txBody>
       </p:sp>
@@ -4036,7 +4042,7 @@
         </p:nvSpPr>
         <p:spPr>
           <a:xfrm>
-            <a:off x="380994" y="3672958"/>
+            <a:off x="380994" y="3757710"/>
             <a:ext cx="1850314" cy="276999"/>
           </a:xfrm>
           <a:prstGeom prst="rect">
@@ -4417,7 +4423,7 @@
         </p:nvSpPr>
         <p:spPr>
           <a:xfrm>
-            <a:off x="4029067" y="6081243"/>
+            <a:off x="4650433" y="6129968"/>
             <a:ext cx="1902539" cy="418610"/>
           </a:xfrm>
           <a:prstGeom prst="rect">
@@ -4518,7 +4524,7 @@
         </p:nvSpPr>
         <p:spPr>
           <a:xfrm>
-            <a:off x="3752841" y="3447556"/>
+            <a:off x="3706222" y="2366633"/>
             <a:ext cx="3790959" cy="185563"/>
           </a:xfrm>
           <a:prstGeom prst="rightArrow">
@@ -4617,6 +4623,153 @@
         <p:spPr>
           <a:xfrm>
             <a:off x="3706224" y="901061"/>
+            <a:ext cx="3790959" cy="185563"/>
+          </a:xfrm>
+          <a:prstGeom prst="rightArrow">
+            <a:avLst/>
+          </a:prstGeom>
+          <a:solidFill>
+            <a:srgbClr val="FF0000"/>
+          </a:solidFill>
+        </p:spPr>
+        <p:style>
+          <a:lnRef idx="2">
+            <a:schemeClr val="accent1">
+              <a:shade val="50000"/>
+            </a:schemeClr>
+          </a:lnRef>
+          <a:fillRef idx="1">
+            <a:schemeClr val="accent1"/>
+          </a:fillRef>
+          <a:effectRef idx="0">
+            <a:schemeClr val="accent1"/>
+          </a:effectRef>
+          <a:fontRef idx="minor">
+            <a:schemeClr val="lt1"/>
+          </a:fontRef>
+        </p:style>
+        <p:txBody>
+          <a:bodyPr rtlCol="0" anchor="ctr"/>
+          <a:lstStyle/>
+          <a:p>
+            <a:pPr algn="ctr"/>
+            <a:endParaRPr lang="en-US"/>
+          </a:p>
+        </p:txBody>
+      </p:sp>
+      <p:sp>
+        <p:nvSpPr>
+          <p:cNvPr id="2" name="TextBox 1">
+            <a:extLst>
+              <a:ext uri="{FF2B5EF4-FFF2-40B4-BE49-F238E27FC236}">
+                <a16:creationId xmlns:a16="http://schemas.microsoft.com/office/drawing/2014/main" id="{9AD3C9CC-1D3D-42F3-8DBD-ADEEA0C43380}"/>
+              </a:ext>
+            </a:extLst>
+          </p:cNvPr>
+          <p:cNvSpPr txBox="1"/>
+          <p:nvPr/>
+        </p:nvSpPr>
+        <p:spPr>
+          <a:xfrm>
+            <a:off x="380994" y="2902405"/>
+            <a:ext cx="1685925" cy="461665"/>
+          </a:xfrm>
+          <a:prstGeom prst="rect">
+            <a:avLst/>
+          </a:prstGeom>
+          <a:noFill/>
+        </p:spPr>
+        <p:txBody>
+          <a:bodyPr wrap="square" rtlCol="0">
+            <a:spAutoFit/>
+          </a:bodyPr>
+          <a:lstStyle/>
+          <a:p>
+            <a:pPr algn="ctr"/>
+            <a:r>
+              <a:rPr lang="en-US" sz="1200" b="1" dirty="0">
+                <a:latin typeface="Arial" panose="020B0604020202020204" pitchFamily="34" charset="0"/>
+                <a:cs typeface="Arial" panose="020B0604020202020204" pitchFamily="34" charset="0"/>
+              </a:rPr>
+              <a:t>block4b_project_bn</a:t>
+            </a:r>
+          </a:p>
+          <a:p>
+            <a:pPr algn="ctr"/>
+            <a:r>
+              <a:rPr lang="en-US" sz="1200" b="1" dirty="0">
+                <a:latin typeface="Arial" panose="020B0604020202020204" pitchFamily="34" charset="0"/>
+                <a:cs typeface="Arial" panose="020B0604020202020204" pitchFamily="34" charset="0"/>
+              </a:rPr>
+              <a:t>block4b_drop</a:t>
+            </a:r>
+          </a:p>
+        </p:txBody>
+      </p:sp>
+      <p:sp>
+        <p:nvSpPr>
+          <p:cNvPr id="13" name="Arrow: Right 12">
+            <a:extLst>
+              <a:ext uri="{FF2B5EF4-FFF2-40B4-BE49-F238E27FC236}">
+                <a16:creationId xmlns:a16="http://schemas.microsoft.com/office/drawing/2014/main" id="{A5C4F947-3C99-4C14-91C2-FF1B38CF764C}"/>
+              </a:ext>
+            </a:extLst>
+          </p:cNvPr>
+          <p:cNvSpPr/>
+          <p:nvPr/>
+        </p:nvSpPr>
+        <p:spPr>
+          <a:xfrm>
+            <a:off x="2066916" y="3093757"/>
+            <a:ext cx="276231" cy="73892"/>
+          </a:xfrm>
+          <a:prstGeom prst="rightArrow">
+            <a:avLst/>
+          </a:prstGeom>
+          <a:solidFill>
+            <a:srgbClr val="FFC000"/>
+          </a:solidFill>
+        </p:spPr>
+        <p:style>
+          <a:lnRef idx="2">
+            <a:schemeClr val="accent1">
+              <a:shade val="50000"/>
+            </a:schemeClr>
+          </a:lnRef>
+          <a:fillRef idx="1">
+            <a:schemeClr val="accent1"/>
+          </a:fillRef>
+          <a:effectRef idx="0">
+            <a:schemeClr val="accent1"/>
+          </a:effectRef>
+          <a:fontRef idx="minor">
+            <a:schemeClr val="lt1"/>
+          </a:fontRef>
+        </p:style>
+        <p:txBody>
+          <a:bodyPr rtlCol="0" anchor="ctr"/>
+          <a:lstStyle/>
+          <a:p>
+            <a:pPr algn="ctr"/>
+            <a:endParaRPr lang="en-US"/>
+          </a:p>
+        </p:txBody>
+      </p:sp>
+      <p:sp>
+        <p:nvSpPr>
+          <p:cNvPr id="15" name="Arrow: Right 14">
+            <a:extLst>
+              <a:ext uri="{FF2B5EF4-FFF2-40B4-BE49-F238E27FC236}">
+                <a16:creationId xmlns:a16="http://schemas.microsoft.com/office/drawing/2014/main" id="{4A253171-0B66-4765-A218-94F7EDF03A81}"/>
+              </a:ext>
+            </a:extLst>
+          </p:cNvPr>
+          <p:cNvSpPr/>
+          <p:nvPr/>
+        </p:nvSpPr>
+        <p:spPr>
+          <a:xfrm>
+            <a:off x="3706221" y="302224"/>
             <a:ext cx="3790959" cy="185563"/>
           </a:xfrm>
           <a:prstGeom prst="rightArrow">

</xml_diff>